<commit_message>
ModelingEdgeInfo ppt view 적용
</commit_message>
<xml_diff>
--- a/DsDotNet/src/UnitTest/UnitTest.Engine/ImportPPT/T3_Real.pptx
+++ b/DsDotNet/src/UnitTest/UnitTest.Engine/ImportPPT/T3_Real.pptx
@@ -221,7 +221,7 @@
           <a:p>
             <a:fld id="{DD503887-5801-43A0-AEF9-041E8DDC2558}" type="datetimeFigureOut">
               <a:rPr lang="ko-KR" altLang="en-US" smtClean="0"/>
-              <a:t>2022-11-05</a:t>
+              <a:t>2022-11-08</a:t>
             </a:fld>
             <a:endParaRPr lang="ko-KR" altLang="en-US" dirty="0"/>
           </a:p>
@@ -398,7 +398,7 @@
           <a:p>
             <a:fld id="{95336A0E-57B1-4D4C-BD9B-2F72B5943464}" type="datetimeFigureOut">
               <a:rPr lang="ko-KR" altLang="en-US" smtClean="0"/>
-              <a:t>2022-11-05</a:t>
+              <a:t>2022-11-08</a:t>
             </a:fld>
             <a:endParaRPr lang="ko-KR" altLang="en-US" dirty="0"/>
           </a:p>
@@ -1154,7 +1154,7 @@
           <a:p>
             <a:fld id="{229D12C7-0FF5-4972-A033-474EFFC79F40}" type="datetime1">
               <a:rPr lang="ko-KR" altLang="en-US" smtClean="0"/>
-              <a:t>2022-11-05</a:t>
+              <a:t>2022-11-08</a:t>
             </a:fld>
             <a:endParaRPr lang="ko-KR" altLang="en-US" dirty="0"/>
           </a:p>
@@ -1352,7 +1352,7 @@
           <a:p>
             <a:fld id="{5BA19FD4-B052-4F56-8FD8-EAFD078DEFB0}" type="datetime1">
               <a:rPr lang="ko-KR" altLang="en-US" smtClean="0"/>
-              <a:t>2022-11-05</a:t>
+              <a:t>2022-11-08</a:t>
             </a:fld>
             <a:endParaRPr lang="ko-KR" altLang="en-US" dirty="0"/>
           </a:p>
@@ -1560,7 +1560,7 @@
           <a:p>
             <a:fld id="{024994B9-23A6-4B0A-A038-AC140E83DAA3}" type="datetime1">
               <a:rPr lang="ko-KR" altLang="en-US" smtClean="0"/>
-              <a:t>2022-11-05</a:t>
+              <a:t>2022-11-08</a:t>
             </a:fld>
             <a:endParaRPr lang="ko-KR" altLang="en-US" dirty="0"/>
           </a:p>
@@ -1758,7 +1758,7 @@
           <a:p>
             <a:fld id="{70D0DAB2-87CB-4028-B965-3AA710ADF2CB}" type="datetime1">
               <a:rPr lang="ko-KR" altLang="en-US" smtClean="0"/>
-              <a:t>2022-11-05</a:t>
+              <a:t>2022-11-08</a:t>
             </a:fld>
             <a:endParaRPr lang="ko-KR" altLang="en-US" dirty="0"/>
           </a:p>
@@ -2033,7 +2033,7 @@
           <a:p>
             <a:fld id="{63FA3D71-FEA8-477F-9D1E-EA860F411BC7}" type="datetime1">
               <a:rPr lang="ko-KR" altLang="en-US" smtClean="0"/>
-              <a:t>2022-11-05</a:t>
+              <a:t>2022-11-08</a:t>
             </a:fld>
             <a:endParaRPr lang="ko-KR" altLang="en-US" dirty="0"/>
           </a:p>
@@ -2298,7 +2298,7 @@
           <a:p>
             <a:fld id="{F58E3EF4-7980-4C97-BA64-EC66995BB574}" type="datetime1">
               <a:rPr lang="ko-KR" altLang="en-US" smtClean="0"/>
-              <a:t>2022-11-05</a:t>
+              <a:t>2022-11-08</a:t>
             </a:fld>
             <a:endParaRPr lang="ko-KR" altLang="en-US" dirty="0"/>
           </a:p>
@@ -2710,7 +2710,7 @@
           <a:p>
             <a:fld id="{FC9BC1D0-7D6B-4634-9D19-644040D74EAE}" type="datetime1">
               <a:rPr lang="ko-KR" altLang="en-US" smtClean="0"/>
-              <a:t>2022-11-05</a:t>
+              <a:t>2022-11-08</a:t>
             </a:fld>
             <a:endParaRPr lang="ko-KR" altLang="en-US" dirty="0"/>
           </a:p>
@@ -2852,7 +2852,7 @@
           <a:p>
             <a:fld id="{B5B1BBC2-B738-4C35-AEE5-660EB2DEB482}" type="datetime1">
               <a:rPr lang="ko-KR" altLang="en-US" smtClean="0"/>
-              <a:t>2022-11-05</a:t>
+              <a:t>2022-11-08</a:t>
             </a:fld>
             <a:endParaRPr lang="ko-KR" altLang="en-US" dirty="0"/>
           </a:p>
@@ -7434,7 +7434,7 @@
           <a:p>
             <a:fld id="{C60E9F93-7E77-4F36-B88C-A425F00C8D91}" type="datetime1">
               <a:rPr lang="ko-KR" altLang="en-US" smtClean="0"/>
-              <a:t>2022-11-05</a:t>
+              <a:t>2022-11-08</a:t>
             </a:fld>
             <a:endParaRPr lang="ko-KR" altLang="en-US" dirty="0"/>
           </a:p>
@@ -7745,7 +7745,7 @@
           <a:p>
             <a:fld id="{36BCCD0E-2A54-4016-BFFC-FEAABCDA6915}" type="datetime1">
               <a:rPr lang="ko-KR" altLang="en-US" smtClean="0"/>
-              <a:t>2022-11-05</a:t>
+              <a:t>2022-11-08</a:t>
             </a:fld>
             <a:endParaRPr lang="ko-KR" altLang="en-US" dirty="0"/>
           </a:p>
@@ -8033,7 +8033,7 @@
           <a:p>
             <a:fld id="{AAF69562-79F1-43EA-AE78-EAD8DB3AEC1A}" type="datetime1">
               <a:rPr lang="ko-KR" altLang="en-US" smtClean="0"/>
-              <a:t>2022-11-05</a:t>
+              <a:t>2022-11-08</a:t>
             </a:fld>
             <a:endParaRPr lang="ko-KR" altLang="en-US" dirty="0"/>
           </a:p>
@@ -8274,7 +8274,7 @@
           <a:p>
             <a:fld id="{C984B0C4-64BA-4E4C-B5E6-A51EE3F6ED95}" type="datetime1">
               <a:rPr lang="ko-KR" altLang="en-US" smtClean="0"/>
-              <a:t>2022-11-05</a:t>
+              <a:t>2022-11-08</a:t>
             </a:fld>
             <a:endParaRPr lang="ko-KR" altLang="en-US" dirty="0"/>
           </a:p>
@@ -9122,7 +9122,7 @@
 </file>
 
 <file path=ppt/slides/slide3.xml><?xml version="1.0" encoding="utf-8"?>
-<p:sld xmlns:a="http://schemas.openxmlformats.org/drawingml/2006/main" xmlns:r="http://schemas.openxmlformats.org/officeDocument/2006/relationships" xmlns:p="http://schemas.openxmlformats.org/presentationml/2006/main">
+<p:sld xmlns:a="http://schemas.openxmlformats.org/drawingml/2006/main" xmlns:r="http://schemas.openxmlformats.org/officeDocument/2006/relationships" xmlns:p="http://schemas.openxmlformats.org/presentationml/2006/main" show="0">
   <p:cSld>
     <p:spTree>
       <p:nvGrpSpPr>
@@ -9423,7 +9423,7 @@
 </file>
 
 <file path=ppt/slides/slide4.xml><?xml version="1.0" encoding="utf-8"?>
-<p:sld xmlns:a="http://schemas.openxmlformats.org/drawingml/2006/main" xmlns:r="http://schemas.openxmlformats.org/officeDocument/2006/relationships" xmlns:p="http://schemas.openxmlformats.org/presentationml/2006/main">
+<p:sld xmlns:a="http://schemas.openxmlformats.org/drawingml/2006/main" xmlns:r="http://schemas.openxmlformats.org/officeDocument/2006/relationships" xmlns:p="http://schemas.openxmlformats.org/presentationml/2006/main" show="0">
   <p:cSld>
     <p:spTree>
       <p:nvGrpSpPr>
@@ -9725,7 +9725,7 @@
 </file>
 
 <file path=ppt/slides/slide5.xml><?xml version="1.0" encoding="utf-8"?>
-<p:sld xmlns:a="http://schemas.openxmlformats.org/drawingml/2006/main" xmlns:r="http://schemas.openxmlformats.org/officeDocument/2006/relationships" xmlns:p="http://schemas.openxmlformats.org/presentationml/2006/main">
+<p:sld xmlns:a="http://schemas.openxmlformats.org/drawingml/2006/main" xmlns:r="http://schemas.openxmlformats.org/officeDocument/2006/relationships" xmlns:p="http://schemas.openxmlformats.org/presentationml/2006/main" show="0">
   <p:cSld>
     <p:spTree>
       <p:nvGrpSpPr>
@@ -10027,7 +10027,7 @@
 </file>
 
 <file path=ppt/slides/slide6.xml><?xml version="1.0" encoding="utf-8"?>
-<p:sld xmlns:a="http://schemas.openxmlformats.org/drawingml/2006/main" xmlns:r="http://schemas.openxmlformats.org/officeDocument/2006/relationships" xmlns:p="http://schemas.openxmlformats.org/presentationml/2006/main">
+<p:sld xmlns:a="http://schemas.openxmlformats.org/drawingml/2006/main" xmlns:r="http://schemas.openxmlformats.org/officeDocument/2006/relationships" xmlns:p="http://schemas.openxmlformats.org/presentationml/2006/main" show="0">
   <p:cSld>
     <p:spTree>
       <p:nvGrpSpPr>
@@ -10330,7 +10330,7 @@
 </file>
 
 <file path=ppt/slides/slide7.xml><?xml version="1.0" encoding="utf-8"?>
-<p:sld xmlns:a="http://schemas.openxmlformats.org/drawingml/2006/main" xmlns:r="http://schemas.openxmlformats.org/officeDocument/2006/relationships" xmlns:p="http://schemas.openxmlformats.org/presentationml/2006/main">
+<p:sld xmlns:a="http://schemas.openxmlformats.org/drawingml/2006/main" xmlns:r="http://schemas.openxmlformats.org/officeDocument/2006/relationships" xmlns:p="http://schemas.openxmlformats.org/presentationml/2006/main" show="0">
   <p:cSld>
     <p:spTree>
       <p:nvGrpSpPr>

</xml_diff>

<commit_message>
ppt import  예외 처리
</commit_message>
<xml_diff>
--- a/DsDotNet/src/UnitTest/UnitTest.Engine/ImportPPT/T3_Real.pptx
+++ b/DsDotNet/src/UnitTest/UnitTest.Engine/ImportPPT/T3_Real.pptx
@@ -221,7 +221,7 @@
           <a:p>
             <a:fld id="{DD503887-5801-43A0-AEF9-041E8DDC2558}" type="datetimeFigureOut">
               <a:rPr lang="ko-KR" altLang="en-US" smtClean="0"/>
-              <a:t>2022-11-08</a:t>
+              <a:t>2022-11-09</a:t>
             </a:fld>
             <a:endParaRPr lang="ko-KR" altLang="en-US" dirty="0"/>
           </a:p>
@@ -398,7 +398,7 @@
           <a:p>
             <a:fld id="{95336A0E-57B1-4D4C-BD9B-2F72B5943464}" type="datetimeFigureOut">
               <a:rPr lang="ko-KR" altLang="en-US" smtClean="0"/>
-              <a:t>2022-11-08</a:t>
+              <a:t>2022-11-09</a:t>
             </a:fld>
             <a:endParaRPr lang="ko-KR" altLang="en-US" dirty="0"/>
           </a:p>
@@ -1154,7 +1154,7 @@
           <a:p>
             <a:fld id="{229D12C7-0FF5-4972-A033-474EFFC79F40}" type="datetime1">
               <a:rPr lang="ko-KR" altLang="en-US" smtClean="0"/>
-              <a:t>2022-11-08</a:t>
+              <a:t>2022-11-09</a:t>
             </a:fld>
             <a:endParaRPr lang="ko-KR" altLang="en-US" dirty="0"/>
           </a:p>
@@ -1352,7 +1352,7 @@
           <a:p>
             <a:fld id="{5BA19FD4-B052-4F56-8FD8-EAFD078DEFB0}" type="datetime1">
               <a:rPr lang="ko-KR" altLang="en-US" smtClean="0"/>
-              <a:t>2022-11-08</a:t>
+              <a:t>2022-11-09</a:t>
             </a:fld>
             <a:endParaRPr lang="ko-KR" altLang="en-US" dirty="0"/>
           </a:p>
@@ -1560,7 +1560,7 @@
           <a:p>
             <a:fld id="{024994B9-23A6-4B0A-A038-AC140E83DAA3}" type="datetime1">
               <a:rPr lang="ko-KR" altLang="en-US" smtClean="0"/>
-              <a:t>2022-11-08</a:t>
+              <a:t>2022-11-09</a:t>
             </a:fld>
             <a:endParaRPr lang="ko-KR" altLang="en-US" dirty="0"/>
           </a:p>
@@ -1758,7 +1758,7 @@
           <a:p>
             <a:fld id="{70D0DAB2-87CB-4028-B965-3AA710ADF2CB}" type="datetime1">
               <a:rPr lang="ko-KR" altLang="en-US" smtClean="0"/>
-              <a:t>2022-11-08</a:t>
+              <a:t>2022-11-09</a:t>
             </a:fld>
             <a:endParaRPr lang="ko-KR" altLang="en-US" dirty="0"/>
           </a:p>
@@ -2033,7 +2033,7 @@
           <a:p>
             <a:fld id="{63FA3D71-FEA8-477F-9D1E-EA860F411BC7}" type="datetime1">
               <a:rPr lang="ko-KR" altLang="en-US" smtClean="0"/>
-              <a:t>2022-11-08</a:t>
+              <a:t>2022-11-09</a:t>
             </a:fld>
             <a:endParaRPr lang="ko-KR" altLang="en-US" dirty="0"/>
           </a:p>
@@ -2298,7 +2298,7 @@
           <a:p>
             <a:fld id="{F58E3EF4-7980-4C97-BA64-EC66995BB574}" type="datetime1">
               <a:rPr lang="ko-KR" altLang="en-US" smtClean="0"/>
-              <a:t>2022-11-08</a:t>
+              <a:t>2022-11-09</a:t>
             </a:fld>
             <a:endParaRPr lang="ko-KR" altLang="en-US" dirty="0"/>
           </a:p>
@@ -2710,7 +2710,7 @@
           <a:p>
             <a:fld id="{FC9BC1D0-7D6B-4634-9D19-644040D74EAE}" type="datetime1">
               <a:rPr lang="ko-KR" altLang="en-US" smtClean="0"/>
-              <a:t>2022-11-08</a:t>
+              <a:t>2022-11-09</a:t>
             </a:fld>
             <a:endParaRPr lang="ko-KR" altLang="en-US" dirty="0"/>
           </a:p>
@@ -2852,7 +2852,7 @@
           <a:p>
             <a:fld id="{B5B1BBC2-B738-4C35-AEE5-660EB2DEB482}" type="datetime1">
               <a:rPr lang="ko-KR" altLang="en-US" smtClean="0"/>
-              <a:t>2022-11-08</a:t>
+              <a:t>2022-11-09</a:t>
             </a:fld>
             <a:endParaRPr lang="ko-KR" altLang="en-US" dirty="0"/>
           </a:p>
@@ -7434,7 +7434,7 @@
           <a:p>
             <a:fld id="{C60E9F93-7E77-4F36-B88C-A425F00C8D91}" type="datetime1">
               <a:rPr lang="ko-KR" altLang="en-US" smtClean="0"/>
-              <a:t>2022-11-08</a:t>
+              <a:t>2022-11-09</a:t>
             </a:fld>
             <a:endParaRPr lang="ko-KR" altLang="en-US" dirty="0"/>
           </a:p>
@@ -7745,7 +7745,7 @@
           <a:p>
             <a:fld id="{36BCCD0E-2A54-4016-BFFC-FEAABCDA6915}" type="datetime1">
               <a:rPr lang="ko-KR" altLang="en-US" smtClean="0"/>
-              <a:t>2022-11-08</a:t>
+              <a:t>2022-11-09</a:t>
             </a:fld>
             <a:endParaRPr lang="ko-KR" altLang="en-US" dirty="0"/>
           </a:p>
@@ -8033,7 +8033,7 @@
           <a:p>
             <a:fld id="{AAF69562-79F1-43EA-AE78-EAD8DB3AEC1A}" type="datetime1">
               <a:rPr lang="ko-KR" altLang="en-US" smtClean="0"/>
-              <a:t>2022-11-08</a:t>
+              <a:t>2022-11-09</a:t>
             </a:fld>
             <a:endParaRPr lang="ko-KR" altLang="en-US" dirty="0"/>
           </a:p>
@@ -8274,7 +8274,7 @@
           <a:p>
             <a:fld id="{C984B0C4-64BA-4E4C-B5E6-A51EE3F6ED95}" type="datetime1">
               <a:rPr lang="ko-KR" altLang="en-US" smtClean="0"/>
-              <a:t>2022-11-08</a:t>
+              <a:t>2022-11-09</a:t>
             </a:fld>
             <a:endParaRPr lang="ko-KR" altLang="en-US" dirty="0"/>
           </a:p>
@@ -9122,7 +9122,7 @@
 </file>
 
 <file path=ppt/slides/slide3.xml><?xml version="1.0" encoding="utf-8"?>
-<p:sld xmlns:a="http://schemas.openxmlformats.org/drawingml/2006/main" xmlns:r="http://schemas.openxmlformats.org/officeDocument/2006/relationships" xmlns:p="http://schemas.openxmlformats.org/presentationml/2006/main" show="0">
+<p:sld xmlns:a="http://schemas.openxmlformats.org/drawingml/2006/main" xmlns:r="http://schemas.openxmlformats.org/officeDocument/2006/relationships" xmlns:p="http://schemas.openxmlformats.org/presentationml/2006/main">
   <p:cSld>
     <p:spTree>
       <p:nvGrpSpPr>
@@ -9423,7 +9423,7 @@
 </file>
 
 <file path=ppt/slides/slide4.xml><?xml version="1.0" encoding="utf-8"?>
-<p:sld xmlns:a="http://schemas.openxmlformats.org/drawingml/2006/main" xmlns:r="http://schemas.openxmlformats.org/officeDocument/2006/relationships" xmlns:p="http://schemas.openxmlformats.org/presentationml/2006/main" show="0">
+<p:sld xmlns:a="http://schemas.openxmlformats.org/drawingml/2006/main" xmlns:r="http://schemas.openxmlformats.org/officeDocument/2006/relationships" xmlns:p="http://schemas.openxmlformats.org/presentationml/2006/main">
   <p:cSld>
     <p:spTree>
       <p:nvGrpSpPr>
@@ -9725,7 +9725,7 @@
 </file>
 
 <file path=ppt/slides/slide5.xml><?xml version="1.0" encoding="utf-8"?>
-<p:sld xmlns:a="http://schemas.openxmlformats.org/drawingml/2006/main" xmlns:r="http://schemas.openxmlformats.org/officeDocument/2006/relationships" xmlns:p="http://schemas.openxmlformats.org/presentationml/2006/main" show="0">
+<p:sld xmlns:a="http://schemas.openxmlformats.org/drawingml/2006/main" xmlns:r="http://schemas.openxmlformats.org/officeDocument/2006/relationships" xmlns:p="http://schemas.openxmlformats.org/presentationml/2006/main">
   <p:cSld>
     <p:spTree>
       <p:nvGrpSpPr>
@@ -10027,7 +10027,7 @@
 </file>
 
 <file path=ppt/slides/slide6.xml><?xml version="1.0" encoding="utf-8"?>
-<p:sld xmlns:a="http://schemas.openxmlformats.org/drawingml/2006/main" xmlns:r="http://schemas.openxmlformats.org/officeDocument/2006/relationships" xmlns:p="http://schemas.openxmlformats.org/presentationml/2006/main" show="0">
+<p:sld xmlns:a="http://schemas.openxmlformats.org/drawingml/2006/main" xmlns:r="http://schemas.openxmlformats.org/officeDocument/2006/relationships" xmlns:p="http://schemas.openxmlformats.org/presentationml/2006/main">
   <p:cSld>
     <p:spTree>
       <p:nvGrpSpPr>
@@ -10330,7 +10330,7 @@
 </file>
 
 <file path=ppt/slides/slide7.xml><?xml version="1.0" encoding="utf-8"?>
-<p:sld xmlns:a="http://schemas.openxmlformats.org/drawingml/2006/main" xmlns:r="http://schemas.openxmlformats.org/officeDocument/2006/relationships" xmlns:p="http://schemas.openxmlformats.org/presentationml/2006/main" show="0">
+<p:sld xmlns:a="http://schemas.openxmlformats.org/drawingml/2006/main" xmlns:r="http://schemas.openxmlformats.org/officeDocument/2006/relationships" xmlns:p="http://schemas.openxmlformats.org/presentationml/2006/main">
   <p:cSld>
     <p:spTree>
       <p:nvGrpSpPr>

</xml_diff>